<commit_message>
More updates to the plan
</commit_message>
<xml_diff>
--- a/Kick_off_slides.pptx
+++ b/Kick_off_slides.pptx
@@ -3585,6 +3585,10 @@
           </a:p>
           <a:p>
             <a:pPr lvl="1"/>
+            <a:r>
+              <a:rPr lang="en-US"/>
+              <a:t>  </a:t>
+            </a:r>
             <a:endParaRPr lang="en-US" dirty="0"/>
           </a:p>
         </p:txBody>

</xml_diff>